<commit_message>
Update document and what's new for 2022.2
</commit_message>
<xml_diff>
--- a/docs/presentations/Sage300SDK_2022_2WebSDKOverview.pptx
+++ b/docs/presentations/Sage300SDK_2022_2WebSDKOverview.pptx
@@ -5,10 +5,10 @@
     <p:sldMasterId id="2147483698" r:id="rId1"/>
   </p:sldMasterIdLst>
   <p:notesMasterIdLst>
-    <p:notesMasterId r:id="rId19"/>
+    <p:notesMasterId r:id="rId21"/>
   </p:notesMasterIdLst>
   <p:handoutMasterIdLst>
-    <p:handoutMasterId r:id="rId20"/>
+    <p:handoutMasterId r:id="rId22"/>
   </p:handoutMasterIdLst>
   <p:sldIdLst>
     <p:sldId id="416" r:id="rId2"/>
@@ -27,7 +27,9 @@
     <p:sldId id="402" r:id="rId15"/>
     <p:sldId id="453" r:id="rId16"/>
     <p:sldId id="454" r:id="rId17"/>
-    <p:sldId id="367" r:id="rId18"/>
+    <p:sldId id="457" r:id="rId18"/>
+    <p:sldId id="458" r:id="rId19"/>
+    <p:sldId id="367" r:id="rId20"/>
   </p:sldIdLst>
   <p:sldSz cx="12188825" cy="6858000"/>
   <p:notesSz cx="7099300" cy="10234613"/>
@@ -457,7 +459,7 @@
                 <a:cs typeface="Arial Regular" charset="0"/>
               </a:rPr>
               <a:pPr/>
-              <a:t>18/04/2022</a:t>
+              <a:t>26/04/2022</a:t>
             </a:fld>
             <a:endParaRPr lang="en-GB" i="0" dirty="0">
               <a:latin typeface="Arial Regular" charset="0"/>
@@ -1330,7 +1332,7 @@
           <a:p>
             <a:fld id="{5888F94E-78DA-0A44-B001-7EA9DD84ADCF}" type="datetime1">
               <a:rPr lang="en-US" smtClean="0"/>
-              <a:t>4/18/2022</a:t>
+              <a:t>4/26/2022</a:t>
             </a:fld>
             <a:endParaRPr lang="en-GB" dirty="0"/>
           </a:p>
@@ -1566,7 +1568,7 @@
           <a:p>
             <a:fld id="{E7CEA641-1E1B-F449-83C8-08B6AFC57F70}" type="datetime1">
               <a:rPr lang="en-US" smtClean="0"/>
-              <a:t>4/18/2022</a:t>
+              <a:t>4/26/2022</a:t>
             </a:fld>
             <a:endParaRPr lang="en-GB" dirty="0"/>
           </a:p>
@@ -1771,7 +1773,7 @@
           <a:p>
             <a:fld id="{C4408730-D2BD-1349-A0F9-216E3D120933}" type="datetime1">
               <a:rPr lang="en-US" smtClean="0"/>
-              <a:t>4/18/2022</a:t>
+              <a:t>4/26/2022</a:t>
             </a:fld>
             <a:endParaRPr lang="en-GB" dirty="0"/>
           </a:p>
@@ -2037,7 +2039,7 @@
           <a:p>
             <a:fld id="{692A7C57-5026-3642-8A3D-6372115071EE}" type="datetime1">
               <a:rPr lang="en-US" smtClean="0"/>
-              <a:t>4/18/2022</a:t>
+              <a:t>4/26/2022</a:t>
             </a:fld>
             <a:endParaRPr lang="en-GB" dirty="0"/>
           </a:p>
@@ -2399,7 +2401,7 @@
           <a:p>
             <a:fld id="{6113F527-9BEA-5644-A1FC-5003BCA94593}" type="datetime1">
               <a:rPr lang="en-US" smtClean="0"/>
-              <a:t>4/18/2022</a:t>
+              <a:t>4/26/2022</a:t>
             </a:fld>
             <a:endParaRPr lang="en-GB" dirty="0"/>
           </a:p>
@@ -2718,7 +2720,7 @@
           <a:p>
             <a:fld id="{A82E4E1A-03D7-724E-8BCA-533838960A70}" type="datetime1">
               <a:rPr lang="en-US" smtClean="0"/>
-              <a:t>4/18/2022</a:t>
+              <a:t>4/26/2022</a:t>
             </a:fld>
             <a:endParaRPr lang="en-GB" dirty="0"/>
           </a:p>
@@ -3195,7 +3197,7 @@
           <a:p>
             <a:fld id="{FB28A7CD-1E91-674E-89EE-B2B00E6C1F81}" type="datetime1">
               <a:rPr lang="en-US" smtClean="0"/>
-              <a:t>4/18/2022</a:t>
+              <a:t>4/26/2022</a:t>
             </a:fld>
             <a:endParaRPr lang="en-GB" dirty="0"/>
           </a:p>
@@ -3762,7 +3764,7 @@
           <a:p>
             <a:fld id="{E636F327-FED6-7B44-A731-9DC52AF69E79}" type="datetime1">
               <a:rPr lang="en-US" smtClean="0"/>
-              <a:t>4/18/2022</a:t>
+              <a:t>4/26/2022</a:t>
             </a:fld>
             <a:endParaRPr lang="en-GB" dirty="0"/>
           </a:p>
@@ -4133,7 +4135,7 @@
           <a:p>
             <a:fld id="{5563C629-E84F-A64B-A9C1-B1797219521B}" type="datetime1">
               <a:rPr lang="en-US" smtClean="0"/>
-              <a:t>4/18/2022</a:t>
+              <a:t>4/26/2022</a:t>
             </a:fld>
             <a:endParaRPr lang="en-GB" dirty="0"/>
           </a:p>
@@ -4237,6 +4239,20 @@
               <a:t>Updated CommonCore.chm</a:t>
             </a:r>
           </a:p>
+          <a:p>
+            <a:pPr lvl="1"/>
+            <a:r>
+              <a:rPr lang="en-US" dirty="0"/>
+              <a:t>Added Sage300SDK_IntegratingNavigationControl.docx</a:t>
+            </a:r>
+          </a:p>
+          <a:p>
+            <a:pPr lvl="2"/>
+            <a:r>
+              <a:rPr lang="en-US" dirty="0"/>
+              <a:t>Illustrates how to had navigation controls (VCR buttons) to a finder property</a:t>
+            </a:r>
+          </a:p>
         </p:txBody>
       </p:sp>
       <p:sp>
@@ -4278,7 +4294,7 @@
           <a:p>
             <a:fld id="{E636F327-FED6-7B44-A731-9DC52AF69E79}" type="datetime1">
               <a:rPr lang="en-US" smtClean="0"/>
-              <a:t>4/18/2022</a:t>
+              <a:t>4/26/2022</a:t>
             </a:fld>
             <a:endParaRPr lang="en-GB" dirty="0"/>
           </a:p>
@@ -4383,7 +4399,7 @@
           <a:p>
             <a:fld id="{5563C629-E84F-A64B-A9C1-B1797219521B}" type="datetime1">
               <a:rPr lang="en-US" smtClean="0"/>
-              <a:t>4/18/2022</a:t>
+              <a:t>4/26/2022</a:t>
             </a:fld>
             <a:endParaRPr lang="en-GB" dirty="0"/>
           </a:p>
@@ -4493,7 +4509,7 @@
           <a:p>
             <a:fld id="{7B9A185B-5299-034D-8ACE-E5F5EABAE1AB}" type="datetime1">
               <a:rPr lang="en-US" smtClean="0"/>
-              <a:t>4/18/2022</a:t>
+              <a:t>4/26/2022</a:t>
             </a:fld>
             <a:endParaRPr lang="en-GB" dirty="0"/>
           </a:p>
@@ -4859,7 +4875,7 @@
           <a:p>
             <a:fld id="{5563C629-E84F-A64B-A9C1-B1797219521B}" type="datetime1">
               <a:rPr lang="en-US" smtClean="0"/>
-              <a:t>4/18/2022</a:t>
+              <a:t>4/26/2022</a:t>
             </a:fld>
             <a:endParaRPr lang="en-GB" dirty="0"/>
           </a:p>
@@ -4969,7 +4985,7 @@
           <a:p>
             <a:fld id="{7B9A185B-5299-034D-8ACE-E5F5EABAE1AB}" type="datetime1">
               <a:rPr lang="en-US" smtClean="0"/>
-              <a:t>4/18/2022</a:t>
+              <a:t>4/26/2022</a:t>
             </a:fld>
             <a:endParaRPr lang="en-GB" dirty="0"/>
           </a:p>
@@ -5113,6 +5129,298 @@
 </file>
 
 <file path=ppt/slides/slide17.xml><?xml version="1.0" encoding="utf-8"?>
+<p:sld xmlns:a="http://schemas.openxmlformats.org/drawingml/2006/main" xmlns:r="http://schemas.openxmlformats.org/officeDocument/2006/relationships" xmlns:p="http://schemas.openxmlformats.org/presentationml/2006/main">
+  <p:cSld>
+    <p:spTree>
+      <p:nvGrpSpPr>
+        <p:cNvPr id="1" name=""/>
+        <p:cNvGrpSpPr/>
+        <p:nvPr/>
+      </p:nvGrpSpPr>
+      <p:grpSpPr>
+        <a:xfrm>
+          <a:off x="0" y="0"/>
+          <a:ext cx="0" cy="0"/>
+          <a:chOff x="0" y="0"/>
+          <a:chExt cx="0" cy="0"/>
+        </a:xfrm>
+      </p:grpSpPr>
+      <p:sp>
+        <p:nvSpPr>
+          <p:cNvPr id="4" name="Title 3"/>
+          <p:cNvSpPr>
+            <a:spLocks noGrp="1"/>
+          </p:cNvSpPr>
+          <p:nvPr>
+            <p:ph type="title"/>
+          </p:nvPr>
+        </p:nvSpPr>
+        <p:spPr/>
+        <p:txBody>
+          <a:bodyPr/>
+          <a:lstStyle/>
+          <a:p>
+            <a:r>
+              <a:rPr lang="en-GB" dirty="0"/>
+              <a:t>Looking Forward</a:t>
+            </a:r>
+          </a:p>
+        </p:txBody>
+      </p:sp>
+      <p:sp>
+        <p:nvSpPr>
+          <p:cNvPr id="3" name="Date Placeholder 2">
+            <a:extLst>
+              <a:ext uri="{FF2B5EF4-FFF2-40B4-BE49-F238E27FC236}">
+                <a16:creationId xmlns:a16="http://schemas.microsoft.com/office/drawing/2014/main" id="{3FF3133B-31A1-0E41-B892-446EEEDA6844}"/>
+              </a:ext>
+            </a:extLst>
+          </p:cNvPr>
+          <p:cNvSpPr>
+            <a:spLocks noGrp="1"/>
+          </p:cNvSpPr>
+          <p:nvPr>
+            <p:ph type="dt" sz="half" idx="2"/>
+          </p:nvPr>
+        </p:nvSpPr>
+        <p:spPr/>
+        <p:txBody>
+          <a:bodyPr/>
+          <a:lstStyle/>
+          <a:p>
+            <a:fld id="{5563C629-E84F-A64B-A9C1-B1797219521B}" type="datetime1">
+              <a:rPr lang="en-US" smtClean="0"/>
+              <a:t>4/26/2022</a:t>
+            </a:fld>
+            <a:endParaRPr lang="en-GB" dirty="0"/>
+          </a:p>
+        </p:txBody>
+      </p:sp>
+      <p:sp>
+        <p:nvSpPr>
+          <p:cNvPr id="5" name="Slide Number Placeholder 4">
+            <a:extLst>
+              <a:ext uri="{FF2B5EF4-FFF2-40B4-BE49-F238E27FC236}">
+                <a16:creationId xmlns:a16="http://schemas.microsoft.com/office/drawing/2014/main" id="{08AD919A-165E-1547-B174-55CCFD0CE87F}"/>
+              </a:ext>
+            </a:extLst>
+          </p:cNvPr>
+          <p:cNvSpPr>
+            <a:spLocks noGrp="1"/>
+          </p:cNvSpPr>
+          <p:nvPr>
+            <p:ph type="sldNum" sz="quarter" idx="4"/>
+          </p:nvPr>
+        </p:nvSpPr>
+        <p:spPr/>
+        <p:txBody>
+          <a:bodyPr/>
+          <a:lstStyle/>
+          <a:p>
+            <a:fld id="{C801F209-6BE7-4AF7-9211-E3F7558EC97C}" type="slidenum">
+              <a:rPr lang="en-GB" smtClean="0"/>
+              <a:pPr/>
+              <a:t>17</a:t>
+            </a:fld>
+            <a:endParaRPr lang="en-GB" dirty="0"/>
+          </a:p>
+        </p:txBody>
+      </p:sp>
+    </p:spTree>
+    <p:extLst>
+      <p:ext uri="{BB962C8B-B14F-4D97-AF65-F5344CB8AC3E}">
+        <p14:creationId xmlns:p14="http://schemas.microsoft.com/office/powerpoint/2010/main" val="150921909"/>
+      </p:ext>
+    </p:extLst>
+  </p:cSld>
+  <p:clrMapOvr>
+    <a:masterClrMapping/>
+  </p:clrMapOvr>
+</p:sld>
+</file>
+
+<file path=ppt/slides/slide18.xml><?xml version="1.0" encoding="utf-8"?>
+<p:sld xmlns:a="http://schemas.openxmlformats.org/drawingml/2006/main" xmlns:r="http://schemas.openxmlformats.org/officeDocument/2006/relationships" xmlns:p="http://schemas.openxmlformats.org/presentationml/2006/main">
+  <p:cSld>
+    <p:spTree>
+      <p:nvGrpSpPr>
+        <p:cNvPr id="1" name=""/>
+        <p:cNvGrpSpPr/>
+        <p:nvPr/>
+      </p:nvGrpSpPr>
+      <p:grpSpPr>
+        <a:xfrm>
+          <a:off x="0" y="0"/>
+          <a:ext cx="0" cy="0"/>
+          <a:chOff x="0" y="0"/>
+          <a:chExt cx="0" cy="0"/>
+        </a:xfrm>
+      </p:grpSpPr>
+      <p:sp>
+        <p:nvSpPr>
+          <p:cNvPr id="2" name="Title 1"/>
+          <p:cNvSpPr>
+            <a:spLocks noGrp="1"/>
+          </p:cNvSpPr>
+          <p:nvPr>
+            <p:ph type="title"/>
+          </p:nvPr>
+        </p:nvSpPr>
+        <p:spPr/>
+        <p:txBody>
+          <a:bodyPr/>
+          <a:lstStyle/>
+          <a:p>
+            <a:r>
+              <a:rPr lang="en-US" dirty="0"/>
+              <a:t>Looking Forward</a:t>
+            </a:r>
+          </a:p>
+        </p:txBody>
+      </p:sp>
+      <p:sp>
+        <p:nvSpPr>
+          <p:cNvPr id="3" name="Date Placeholder 2"/>
+          <p:cNvSpPr>
+            <a:spLocks noGrp="1"/>
+          </p:cNvSpPr>
+          <p:nvPr>
+            <p:ph type="dt" sz="half" idx="2"/>
+          </p:nvPr>
+        </p:nvSpPr>
+        <p:spPr>
+          <a:xfrm>
+            <a:off x="526703" y="6356350"/>
+            <a:ext cx="2741613" cy="365125"/>
+          </a:xfrm>
+        </p:spPr>
+        <p:txBody>
+          <a:bodyPr/>
+          <a:lstStyle/>
+          <a:p>
+            <a:fld id="{7B9A185B-5299-034D-8ACE-E5F5EABAE1AB}" type="datetime1">
+              <a:rPr lang="en-US" smtClean="0"/>
+              <a:t>4/26/2022</a:t>
+            </a:fld>
+            <a:endParaRPr lang="en-GB" dirty="0"/>
+          </a:p>
+        </p:txBody>
+      </p:sp>
+      <p:sp>
+        <p:nvSpPr>
+          <p:cNvPr id="4" name="Slide Number Placeholder 3"/>
+          <p:cNvSpPr>
+            <a:spLocks noGrp="1"/>
+          </p:cNvSpPr>
+          <p:nvPr>
+            <p:ph type="sldNum" sz="quarter" idx="4"/>
+          </p:nvPr>
+        </p:nvSpPr>
+        <p:spPr>
+          <a:xfrm>
+            <a:off x="8880316" y="6356350"/>
+            <a:ext cx="2741612" cy="365125"/>
+          </a:xfrm>
+        </p:spPr>
+        <p:txBody>
+          <a:bodyPr/>
+          <a:lstStyle/>
+          <a:p>
+            <a:fld id="{C801F209-6BE7-4AF7-9211-E3F7558EC97C}" type="slidenum">
+              <a:rPr lang="en-GB" smtClean="0"/>
+              <a:pPr/>
+              <a:t>18</a:t>
+            </a:fld>
+            <a:endParaRPr lang="en-GB" dirty="0"/>
+          </a:p>
+        </p:txBody>
+      </p:sp>
+      <p:sp>
+        <p:nvSpPr>
+          <p:cNvPr id="5" name="Text Placeholder 4"/>
+          <p:cNvSpPr>
+            <a:spLocks noGrp="1"/>
+          </p:cNvSpPr>
+          <p:nvPr>
+            <p:ph type="body" sz="quarter" idx="12"/>
+          </p:nvPr>
+        </p:nvSpPr>
+        <p:spPr>
+          <a:xfrm>
+            <a:off x="521370" y="1638300"/>
+            <a:ext cx="5946807" cy="4267648"/>
+          </a:xfrm>
+        </p:spPr>
+        <p:txBody>
+          <a:bodyPr/>
+          <a:lstStyle/>
+          <a:p>
+            <a:pPr lvl="1"/>
+            <a:r>
+              <a:rPr lang="en-US" dirty="0"/>
+              <a:t>For the Sage 300 2023 release (August 2022) we are contemplating only supporting the Wizards in Visual Studio 2022</a:t>
+            </a:r>
+          </a:p>
+          <a:p>
+            <a:pPr lvl="1"/>
+            <a:r>
+              <a:rPr lang="en-US" dirty="0"/>
+              <a:t>Development may still be done in Visual Studio 2019, or even 2017, but there are fundamental changes in Visual Studio 2022 for plug-ins that will require significant changes to support both Visual Studio 2019 and Visual Studio 2022</a:t>
+            </a:r>
+          </a:p>
+          <a:p>
+            <a:pPr lvl="1"/>
+            <a:r>
+              <a:rPr lang="en-US" dirty="0"/>
+              <a:t>Therefore, in addition to staying current, it also simplifies the plug-ins!</a:t>
+            </a:r>
+          </a:p>
+        </p:txBody>
+      </p:sp>
+      <p:pic>
+        <p:nvPicPr>
+          <p:cNvPr id="8" name="Picture 7">
+            <a:extLst>
+              <a:ext uri="{FF2B5EF4-FFF2-40B4-BE49-F238E27FC236}">
+                <a16:creationId xmlns:a16="http://schemas.microsoft.com/office/drawing/2014/main" id="{051CFDC3-44F2-4527-A64D-9403B7155FA1}"/>
+              </a:ext>
+            </a:extLst>
+          </p:cNvPr>
+          <p:cNvPicPr>
+            <a:picLocks noChangeAspect="1"/>
+          </p:cNvPicPr>
+          <p:nvPr/>
+        </p:nvPicPr>
+        <p:blipFill>
+          <a:blip r:embed="rId2"/>
+          <a:stretch>
+            <a:fillRect/>
+          </a:stretch>
+        </p:blipFill>
+        <p:spPr>
+          <a:xfrm>
+            <a:off x="6652019" y="2116838"/>
+            <a:ext cx="5417352" cy="2624323"/>
+          </a:xfrm>
+          <a:prstGeom prst="rect">
+            <a:avLst/>
+          </a:prstGeom>
+        </p:spPr>
+      </p:pic>
+    </p:spTree>
+    <p:extLst>
+      <p:ext uri="{BB962C8B-B14F-4D97-AF65-F5344CB8AC3E}">
+        <p14:creationId xmlns:p14="http://schemas.microsoft.com/office/powerpoint/2010/main" val="3041563994"/>
+      </p:ext>
+    </p:extLst>
+  </p:cSld>
+  <p:clrMapOvr>
+    <a:masterClrMapping/>
+  </p:clrMapOvr>
+</p:sld>
+</file>
+
+<file path=ppt/slides/slide19.xml><?xml version="1.0" encoding="utf-8"?>
 <p:sld xmlns:a="http://schemas.openxmlformats.org/drawingml/2006/main" xmlns:r="http://schemas.openxmlformats.org/officeDocument/2006/relationships" xmlns:p="http://schemas.openxmlformats.org/presentationml/2006/main">
   <p:cSld>
     <p:spTree>
@@ -5440,7 +5748,7 @@
           <a:p>
             <a:fld id="{94732040-5182-E143-8A0A-1F1F1B9AD853}" type="datetime1">
               <a:rPr lang="en-US" smtClean="0"/>
-              <a:t>4/18/2022</a:t>
+              <a:t>4/26/2022</a:t>
             </a:fld>
             <a:endParaRPr lang="en-GB" dirty="0"/>
           </a:p>
@@ -5580,7 +5888,7 @@
           <a:p>
             <a:fld id="{5563C629-E84F-A64B-A9C1-B1797219521B}" type="datetime1">
               <a:rPr lang="en-US" smtClean="0"/>
-              <a:t>4/18/2022</a:t>
+              <a:t>4/26/2022</a:t>
             </a:fld>
             <a:endParaRPr lang="en-GB" dirty="0"/>
           </a:p>
@@ -5690,7 +5998,7 @@
           <a:p>
             <a:fld id="{550DC455-A182-7641-94AB-920BA179357D}" type="datetime1">
               <a:rPr lang="en-US" smtClean="0"/>
-              <a:t>4/18/2022</a:t>
+              <a:t>4/26/2022</a:t>
             </a:fld>
             <a:endParaRPr lang="en-GB" dirty="0"/>
           </a:p>
@@ -6291,7 +6599,7 @@
           <a:p>
             <a:fld id="{5563C629-E84F-A64B-A9C1-B1797219521B}" type="datetime1">
               <a:rPr lang="en-US" smtClean="0"/>
-              <a:t>4/18/2022</a:t>
+              <a:t>4/26/2022</a:t>
             </a:fld>
             <a:endParaRPr lang="en-GB" dirty="0"/>
           </a:p>
@@ -6401,7 +6709,7 @@
           <a:p>
             <a:fld id="{550DC455-A182-7641-94AB-920BA179357D}" type="datetime1">
               <a:rPr lang="en-US" smtClean="0"/>
-              <a:t>4/18/2022</a:t>
+              <a:t>4/26/2022</a:t>
             </a:fld>
             <a:endParaRPr lang="en-GB" dirty="0"/>
           </a:p>
@@ -7375,7 +7683,7 @@
           <a:p>
             <a:fld id="{5563C629-E84F-A64B-A9C1-B1797219521B}" type="datetime1">
               <a:rPr lang="en-US" smtClean="0"/>
-              <a:t>4/18/2022</a:t>
+              <a:t>4/26/2022</a:t>
             </a:fld>
             <a:endParaRPr lang="en-GB" dirty="0"/>
           </a:p>
@@ -7552,7 +7860,7 @@
           <a:p>
             <a:fld id="{E636F327-FED6-7B44-A731-9DC52AF69E79}" type="datetime1">
               <a:rPr lang="en-US" smtClean="0"/>
-              <a:t>4/18/2022</a:t>
+              <a:t>4/26/2022</a:t>
             </a:fld>
             <a:endParaRPr lang="en-GB" dirty="0"/>
           </a:p>
@@ -7657,7 +7965,7 @@
           <a:p>
             <a:fld id="{5563C629-E84F-A64B-A9C1-B1797219521B}" type="datetime1">
               <a:rPr lang="en-US" smtClean="0"/>
-              <a:t>4/18/2022</a:t>
+              <a:t>4/26/2022</a:t>
             </a:fld>
             <a:endParaRPr lang="en-GB" dirty="0"/>
           </a:p>

</xml_diff>